<commit_message>
Create new project folder for semestral project because of issue with previous
</commit_message>
<xml_diff>
--- a/bit_projekt/BIT_projekt_prezentacia.pptx
+++ b/bit_projekt/BIT_projekt_prezentacia.pptx
@@ -5,7 +5,7 @@
     <p:sldMasterId id="2147483648" r:id="rId1"/>
   </p:sldMasterIdLst>
   <p:notesMasterIdLst>
-    <p:notesMasterId r:id="rId22"/>
+    <p:notesMasterId r:id="rId23"/>
   </p:notesMasterIdLst>
   <p:sldIdLst>
     <p:sldId id="256" r:id="rId2"/>
@@ -27,7 +27,8 @@
     <p:sldId id="261" r:id="rId18"/>
     <p:sldId id="273" r:id="rId19"/>
     <p:sldId id="276" r:id="rId20"/>
-    <p:sldId id="262" r:id="rId21"/>
+    <p:sldId id="277" r:id="rId21"/>
+    <p:sldId id="262" r:id="rId22"/>
   </p:sldIdLst>
   <p:sldSz cx="12192000" cy="6858000"/>
   <p:notesSz cx="6858000" cy="9144000"/>
@@ -6333,6 +6334,174 @@
           <p:cNvPr id="2" name="Title 1">
             <a:extLst>
               <a:ext uri="{FF2B5EF4-FFF2-40B4-BE49-F238E27FC236}">
+                <a16:creationId xmlns:a16="http://schemas.microsoft.com/office/drawing/2014/main" id="{54B71EBD-6FAB-8B29-E0CA-67257F787D06}"/>
+              </a:ext>
+            </a:extLst>
+          </p:cNvPr>
+          <p:cNvSpPr>
+            <a:spLocks noGrp="1"/>
+          </p:cNvSpPr>
+          <p:nvPr>
+            <p:ph type="title"/>
+          </p:nvPr>
+        </p:nvSpPr>
+        <p:spPr/>
+        <p:txBody>
+          <a:bodyPr/>
+          <a:lstStyle/>
+          <a:p>
+            <a:endParaRPr lang="en-US"/>
+          </a:p>
+        </p:txBody>
+      </p:sp>
+      <p:sp>
+        <p:nvSpPr>
+          <p:cNvPr id="3" name="Content Placeholder 2">
+            <a:extLst>
+              <a:ext uri="{FF2B5EF4-FFF2-40B4-BE49-F238E27FC236}">
+                <a16:creationId xmlns:a16="http://schemas.microsoft.com/office/drawing/2014/main" id="{1BC85470-44CF-611F-32C6-3421D6701AA0}"/>
+              </a:ext>
+            </a:extLst>
+          </p:cNvPr>
+          <p:cNvSpPr>
+            <a:spLocks noGrp="1"/>
+          </p:cNvSpPr>
+          <p:nvPr>
+            <p:ph idx="1"/>
+          </p:nvPr>
+        </p:nvSpPr>
+        <p:spPr/>
+        <p:txBody>
+          <a:bodyPr/>
+          <a:lstStyle/>
+          <a:p>
+            <a:endParaRPr lang="en-US"/>
+          </a:p>
+        </p:txBody>
+      </p:sp>
+      <p:sp>
+        <p:nvSpPr>
+          <p:cNvPr id="4" name="Date Placeholder 3">
+            <a:extLst>
+              <a:ext uri="{FF2B5EF4-FFF2-40B4-BE49-F238E27FC236}">
+                <a16:creationId xmlns:a16="http://schemas.microsoft.com/office/drawing/2014/main" id="{8CFC7F22-49C3-165A-6774-CC2F2D3D23CE}"/>
+              </a:ext>
+            </a:extLst>
+          </p:cNvPr>
+          <p:cNvSpPr>
+            <a:spLocks noGrp="1"/>
+          </p:cNvSpPr>
+          <p:nvPr>
+            <p:ph type="dt" sz="half" idx="10"/>
+          </p:nvPr>
+        </p:nvSpPr>
+        <p:spPr/>
+        <p:txBody>
+          <a:bodyPr/>
+          <a:lstStyle/>
+          <a:p>
+            <a:fld id="{7BEBBC05-8C23-406A-AD74-1B071E15DB84}" type="datetime1">
+              <a:rPr lang="sk-SK" smtClean="0"/>
+              <a:t>26. 11. 2023</a:t>
+            </a:fld>
+            <a:endParaRPr lang="en-US"/>
+          </a:p>
+        </p:txBody>
+      </p:sp>
+      <p:sp>
+        <p:nvSpPr>
+          <p:cNvPr id="5" name="Slide Number Placeholder 4">
+            <a:extLst>
+              <a:ext uri="{FF2B5EF4-FFF2-40B4-BE49-F238E27FC236}">
+                <a16:creationId xmlns:a16="http://schemas.microsoft.com/office/drawing/2014/main" id="{87FC9F97-D951-E7D0-23BE-38CD8DC5F04F}"/>
+              </a:ext>
+            </a:extLst>
+          </p:cNvPr>
+          <p:cNvSpPr>
+            <a:spLocks noGrp="1"/>
+          </p:cNvSpPr>
+          <p:nvPr>
+            <p:ph type="sldNum" sz="quarter" idx="12"/>
+          </p:nvPr>
+        </p:nvSpPr>
+        <p:spPr/>
+        <p:txBody>
+          <a:bodyPr/>
+          <a:lstStyle/>
+          <a:p>
+            <a:fld id="{DA3D5D7B-F6B9-414A-A607-910A1EA7C26A}" type="slidenum">
+              <a:rPr lang="en-US" smtClean="0"/>
+              <a:t>20</a:t>
+            </a:fld>
+            <a:endParaRPr lang="en-US"/>
+          </a:p>
+        </p:txBody>
+      </p:sp>
+      <p:pic>
+        <p:nvPicPr>
+          <p:cNvPr id="7" name="Picture 6">
+            <a:extLst>
+              <a:ext uri="{FF2B5EF4-FFF2-40B4-BE49-F238E27FC236}">
+                <a16:creationId xmlns:a16="http://schemas.microsoft.com/office/drawing/2014/main" id="{8A90BB58-7285-886C-EEAD-3015306E2C97}"/>
+              </a:ext>
+            </a:extLst>
+          </p:cNvPr>
+          <p:cNvPicPr>
+            <a:picLocks noChangeAspect="1"/>
+          </p:cNvPicPr>
+          <p:nvPr/>
+        </p:nvPicPr>
+        <p:blipFill>
+          <a:blip r:embed="rId2"/>
+          <a:stretch>
+            <a:fillRect/>
+          </a:stretch>
+        </p:blipFill>
+        <p:spPr>
+          <a:xfrm>
+            <a:off x="419100" y="1033504"/>
+            <a:ext cx="11353800" cy="4790991"/>
+          </a:xfrm>
+          <a:prstGeom prst="rect">
+            <a:avLst/>
+          </a:prstGeom>
+        </p:spPr>
+      </p:pic>
+    </p:spTree>
+    <p:extLst>
+      <p:ext uri="{BB962C8B-B14F-4D97-AF65-F5344CB8AC3E}">
+        <p14:creationId xmlns:p14="http://schemas.microsoft.com/office/powerpoint/2010/main" val="4226244360"/>
+      </p:ext>
+    </p:extLst>
+  </p:cSld>
+  <p:clrMapOvr>
+    <a:masterClrMapping/>
+  </p:clrMapOvr>
+</p:sld>
+</file>
+
+<file path=ppt/slides/slide21.xml><?xml version="1.0" encoding="utf-8"?>
+<p:sld xmlns:a="http://schemas.openxmlformats.org/drawingml/2006/main" xmlns:r="http://schemas.openxmlformats.org/officeDocument/2006/relationships" xmlns:p="http://schemas.openxmlformats.org/presentationml/2006/main">
+  <p:cSld>
+    <p:spTree>
+      <p:nvGrpSpPr>
+        <p:cNvPr id="1" name=""/>
+        <p:cNvGrpSpPr/>
+        <p:nvPr/>
+      </p:nvGrpSpPr>
+      <p:grpSpPr>
+        <a:xfrm>
+          <a:off x="0" y="0"/>
+          <a:ext cx="0" cy="0"/>
+          <a:chOff x="0" y="0"/>
+          <a:chExt cx="0" cy="0"/>
+        </a:xfrm>
+      </p:grpSpPr>
+      <p:sp>
+        <p:nvSpPr>
+          <p:cNvPr id="2" name="Title 1">
+            <a:extLst>
+              <a:ext uri="{FF2B5EF4-FFF2-40B4-BE49-F238E27FC236}">
                 <a16:creationId xmlns:a16="http://schemas.microsoft.com/office/drawing/2014/main" id="{5F520F4B-51BE-7D79-2243-12484B471923}"/>
               </a:ext>
             </a:extLst>
@@ -6486,7 +6655,7 @@
           <a:p>
             <a:fld id="{DA3D5D7B-F6B9-414A-A607-910A1EA7C26A}" type="slidenum">
               <a:rPr lang="en-US" smtClean="0"/>
-              <a:t>20</a:t>
+              <a:t>21</a:t>
             </a:fld>
             <a:endParaRPr lang="en-US"/>
           </a:p>

</xml_diff>